<commit_message>
Add some extra question in introductory and threat modeling chapter of SSD midterm preparation
</commit_message>
<xml_diff>
--- a/1st semester/Secure Software Design/Lecture 1/Introduction.pptx
+++ b/1st semester/Secure Software Design/Lecture 1/Introduction.pptx
@@ -240,7 +240,7 @@
           <a:p>
             <a:fld id="{60ED5AA7-84F2-42DE-BEA8-90D7F5A60919}" type="datetimeFigureOut">
               <a:rPr lang="en-US" smtClean="0"/>
-              <a:t>2/7/2025</a:t>
+              <a:t>4/7/2025</a:t>
             </a:fld>
             <a:endParaRPr lang="en-US"/>
           </a:p>
@@ -835,7 +835,7 @@
           <a:p>
             <a:fld id="{04247C97-9361-4C51-9E01-F3DD5E6E5A20}" type="datetimeFigureOut">
               <a:rPr lang="en-IN" smtClean="0"/>
-              <a:t>07-02-2025</a:t>
+              <a:t>07-04-2025</a:t>
             </a:fld>
             <a:endParaRPr lang="en-IN"/>
           </a:p>
@@ -1173,7 +1173,7 @@
           <a:p>
             <a:fld id="{04247C97-9361-4C51-9E01-F3DD5E6E5A20}" type="datetimeFigureOut">
               <a:rPr lang="en-IN" smtClean="0"/>
-              <a:t>07-02-2025</a:t>
+              <a:t>07-04-2025</a:t>
             </a:fld>
             <a:endParaRPr lang="en-IN"/>
           </a:p>
@@ -1574,7 +1574,7 @@
           <a:p>
             <a:fld id="{04247C97-9361-4C51-9E01-F3DD5E6E5A20}" type="datetimeFigureOut">
               <a:rPr lang="en-IN" smtClean="0"/>
-              <a:t>07-02-2025</a:t>
+              <a:t>07-04-2025</a:t>
             </a:fld>
             <a:endParaRPr lang="en-IN"/>
           </a:p>
@@ -1910,7 +1910,7 @@
           <a:p>
             <a:fld id="{04247C97-9361-4C51-9E01-F3DD5E6E5A20}" type="datetimeFigureOut">
               <a:rPr lang="en-IN" smtClean="0"/>
-              <a:t>07-02-2025</a:t>
+              <a:t>07-04-2025</a:t>
             </a:fld>
             <a:endParaRPr lang="en-IN"/>
           </a:p>
@@ -2230,7 +2230,7 @@
           <a:p>
             <a:fld id="{04247C97-9361-4C51-9E01-F3DD5E6E5A20}" type="datetimeFigureOut">
               <a:rPr lang="en-IN" smtClean="0"/>
-              <a:t>07-02-2025</a:t>
+              <a:t>07-04-2025</a:t>
             </a:fld>
             <a:endParaRPr lang="en-IN"/>
           </a:p>
@@ -2626,7 +2626,7 @@
           <a:p>
             <a:fld id="{04247C97-9361-4C51-9E01-F3DD5E6E5A20}" type="datetimeFigureOut">
               <a:rPr lang="en-IN" smtClean="0"/>
-              <a:t>07-02-2025</a:t>
+              <a:t>07-04-2025</a:t>
             </a:fld>
             <a:endParaRPr lang="en-IN"/>
           </a:p>
@@ -2883,7 +2883,7 @@
           <a:p>
             <a:fld id="{04247C97-9361-4C51-9E01-F3DD5E6E5A20}" type="datetimeFigureOut">
               <a:rPr lang="en-IN" smtClean="0"/>
-              <a:t>07-02-2025</a:t>
+              <a:t>07-04-2025</a:t>
             </a:fld>
             <a:endParaRPr lang="en-IN"/>
           </a:p>
@@ -3145,7 +3145,7 @@
           <a:p>
             <a:fld id="{04247C97-9361-4C51-9E01-F3DD5E6E5A20}" type="datetimeFigureOut">
               <a:rPr lang="en-IN" smtClean="0"/>
-              <a:t>07-02-2025</a:t>
+              <a:t>07-04-2025</a:t>
             </a:fld>
             <a:endParaRPr lang="en-IN"/>
           </a:p>
@@ -3407,7 +3407,7 @@
           <a:p>
             <a:fld id="{04247C97-9361-4C51-9E01-F3DD5E6E5A20}" type="datetimeFigureOut">
               <a:rPr lang="en-IN" smtClean="0"/>
-              <a:t>07-02-2025</a:t>
+              <a:t>07-04-2025</a:t>
             </a:fld>
             <a:endParaRPr lang="en-IN"/>
           </a:p>
@@ -3736,7 +3736,7 @@
           <a:p>
             <a:fld id="{04247C97-9361-4C51-9E01-F3DD5E6E5A20}" type="datetimeFigureOut">
               <a:rPr lang="en-IN" smtClean="0"/>
-              <a:t>07-02-2025</a:t>
+              <a:t>07-04-2025</a:t>
             </a:fld>
             <a:endParaRPr lang="en-IN"/>
           </a:p>
@@ -4059,7 +4059,7 @@
           <a:p>
             <a:fld id="{04247C97-9361-4C51-9E01-F3DD5E6E5A20}" type="datetimeFigureOut">
               <a:rPr lang="en-IN" smtClean="0"/>
-              <a:t>07-02-2025</a:t>
+              <a:t>07-04-2025</a:t>
             </a:fld>
             <a:endParaRPr lang="en-IN"/>
           </a:p>
@@ -4516,7 +4516,7 @@
           <a:p>
             <a:fld id="{04247C97-9361-4C51-9E01-F3DD5E6E5A20}" type="datetimeFigureOut">
               <a:rPr lang="en-IN" smtClean="0"/>
-              <a:t>07-02-2025</a:t>
+              <a:t>07-04-2025</a:t>
             </a:fld>
             <a:endParaRPr lang="en-IN"/>
           </a:p>
@@ -4721,7 +4721,7 @@
           <a:p>
             <a:fld id="{04247C97-9361-4C51-9E01-F3DD5E6E5A20}" type="datetimeFigureOut">
               <a:rPr lang="en-IN" smtClean="0"/>
-              <a:t>07-02-2025</a:t>
+              <a:t>07-04-2025</a:t>
             </a:fld>
             <a:endParaRPr lang="en-IN"/>
           </a:p>
@@ -4898,7 +4898,7 @@
           <a:p>
             <a:fld id="{04247C97-9361-4C51-9E01-F3DD5E6E5A20}" type="datetimeFigureOut">
               <a:rPr lang="en-IN" smtClean="0"/>
-              <a:t>07-02-2025</a:t>
+              <a:t>07-04-2025</a:t>
             </a:fld>
             <a:endParaRPr lang="en-IN"/>
           </a:p>
@@ -5231,7 +5231,7 @@
           <a:p>
             <a:fld id="{04247C97-9361-4C51-9E01-F3DD5E6E5A20}" type="datetimeFigureOut">
               <a:rPr lang="en-IN" smtClean="0"/>
-              <a:t>07-02-2025</a:t>
+              <a:t>07-04-2025</a:t>
             </a:fld>
             <a:endParaRPr lang="en-IN"/>
           </a:p>
@@ -5576,7 +5576,7 @@
           <a:p>
             <a:fld id="{04247C97-9361-4C51-9E01-F3DD5E6E5A20}" type="datetimeFigureOut">
               <a:rPr lang="en-IN" smtClean="0"/>
-              <a:t>07-02-2025</a:t>
+              <a:t>07-04-2025</a:t>
             </a:fld>
             <a:endParaRPr lang="en-IN"/>
           </a:p>
@@ -7693,7 +7693,7 @@
           <a:p>
             <a:fld id="{04247C97-9361-4C51-9E01-F3DD5E6E5A20}" type="datetimeFigureOut">
               <a:rPr lang="en-IN" smtClean="0"/>
-              <a:t>07-02-2025</a:t>
+              <a:t>07-04-2025</a:t>
             </a:fld>
             <a:endParaRPr lang="en-IN"/>
           </a:p>
@@ -12814,6 +12814,12 @@
               </a:rPr>
               <a:t>Because the human factor is truly security’s weakest link.</a:t>
             </a:r>
+            <a:r>
+              <a:rPr lang="en-US" sz="4000" dirty="0">
+                <a:latin typeface="Century Gothic" panose="020B0502020202020204" pitchFamily="34" charset="0"/>
+              </a:rPr>
+              <a:t/>
+            </a:r>
             <a:br>
               <a:rPr lang="en-US" sz="4000" dirty="0">
                 <a:latin typeface="Century Gothic" panose="020B0502020202020204" pitchFamily="34" charset="0"/>
@@ -13894,6 +13900,15 @@
               </a:rPr>
               <a:t>Course Outcomes </a:t>
             </a:r>
+            <a:r>
+              <a:rPr lang="en-US" sz="1800" dirty="0">
+                <a:effectLst/>
+                <a:latin typeface="Calibri" panose="020F0502020204030204" pitchFamily="34" charset="0"/>
+                <a:ea typeface="Calibri" panose="020F0502020204030204" pitchFamily="34" charset="0"/>
+                <a:cs typeface="Times New Roman" panose="02020603050405020304" pitchFamily="18" charset="0"/>
+              </a:rPr>
+              <a:t/>
+            </a:r>
             <a:br>
               <a:rPr lang="en-US" sz="1800" dirty="0">
                 <a:effectLst/>
@@ -15322,7 +15337,7 @@
                 <a:hlinkClick r:id="rId2">
                   <a:extLst>
                     <a:ext uri="{A12FA001-AC4F-418D-AE19-62706E023703}">
-                      <ahyp:hlinkClr xmlns:ahyp="http://schemas.microsoft.com/office/drawing/2018/hyperlinkcolor" val="tx"/>
+                      <ahyp:hlinkClr xmlns:ahyp="http://schemas.microsoft.com/office/drawing/2018/hyperlinkcolor" xmlns="" val="tx"/>
                     </a:ext>
                   </a:extLst>
                 </a:hlinkClick>
@@ -15339,7 +15354,7 @@
                 <a:hlinkClick r:id="rId2">
                   <a:extLst>
                     <a:ext uri="{A12FA001-AC4F-418D-AE19-62706E023703}">
-                      <ahyp:hlinkClr xmlns:ahyp="http://schemas.microsoft.com/office/drawing/2018/hyperlinkcolor" val="tx"/>
+                      <ahyp:hlinkClr xmlns:ahyp="http://schemas.microsoft.com/office/drawing/2018/hyperlinkcolor" xmlns="" val="tx"/>
                     </a:ext>
                   </a:extLst>
                 </a:hlinkClick>
@@ -15598,7 +15613,7 @@
                 <a:hlinkClick r:id="rId2">
                   <a:extLst>
                     <a:ext uri="{A12FA001-AC4F-418D-AE19-62706E023703}">
-                      <ahyp:hlinkClr xmlns:ahyp="http://schemas.microsoft.com/office/drawing/2018/hyperlinkcolor" val="tx"/>
+                      <ahyp:hlinkClr xmlns:ahyp="http://schemas.microsoft.com/office/drawing/2018/hyperlinkcolor" xmlns="" val="tx"/>
                     </a:ext>
                   </a:extLst>
                 </a:hlinkClick>
@@ -15624,6 +15639,16 @@
                 <a:latin typeface="Muli"/>
               </a:rPr>
               <a:t>Cybersecurity Policy and Strategy</a:t>
+            </a:r>
+            <a:r>
+              <a:rPr lang="en-US" sz="4400" b="0" i="0" dirty="0">
+                <a:solidFill>
+                  <a:srgbClr val="444444"/>
+                </a:solidFill>
+                <a:effectLst/>
+                <a:latin typeface="Muli"/>
+              </a:rPr>
+              <a:t/>
             </a:r>
             <a:br>
               <a:rPr lang="en-US" sz="4400" b="0" i="0" dirty="0">
@@ -15738,7 +15763,7 @@
                 <a:hlinkClick r:id="rId3">
                   <a:extLst>
                     <a:ext uri="{A12FA001-AC4F-418D-AE19-62706E023703}">
-                      <ahyp:hlinkClr xmlns:ahyp="http://schemas.microsoft.com/office/drawing/2018/hyperlinkcolor" val="tx"/>
+                      <ahyp:hlinkClr xmlns:ahyp="http://schemas.microsoft.com/office/drawing/2018/hyperlinkcolor" xmlns="" val="tx"/>
                     </a:ext>
                   </a:extLst>
                 </a:hlinkClick>
@@ -16125,6 +16150,15 @@
               </a:rPr>
               <a:t>Course Content</a:t>
             </a:r>
+            <a:r>
+              <a:rPr lang="en-US" sz="1800" dirty="0">
+                <a:effectLst/>
+                <a:latin typeface="Calibri" panose="020F0502020204030204" pitchFamily="34" charset="0"/>
+                <a:ea typeface="Calibri" panose="020F0502020204030204" pitchFamily="34" charset="0"/>
+                <a:cs typeface="Times New Roman" panose="02020603050405020304" pitchFamily="18" charset="0"/>
+              </a:rPr>
+              <a:t/>
+            </a:r>
             <a:br>
               <a:rPr lang="en-US" sz="1800" dirty="0">
                 <a:effectLst/>
@@ -17001,7 +17035,7 @@
                 <a:hlinkClick r:id="rId2">
                   <a:extLst>
                     <a:ext uri="{A12FA001-AC4F-418D-AE19-62706E023703}">
-                      <ahyp:hlinkClr xmlns:ahyp="http://schemas.microsoft.com/office/drawing/2018/hyperlinkcolor" val="tx"/>
+                      <ahyp:hlinkClr xmlns:ahyp="http://schemas.microsoft.com/office/drawing/2018/hyperlinkcolor" xmlns="" val="tx"/>
                     </a:ext>
                   </a:extLst>
                 </a:hlinkClick>
@@ -17094,7 +17128,7 @@
                 <a:hlinkClick r:id="rId3">
                   <a:extLst>
                     <a:ext uri="{A12FA001-AC4F-418D-AE19-62706E023703}">
-                      <ahyp:hlinkClr xmlns:ahyp="http://schemas.microsoft.com/office/drawing/2018/hyperlinkcolor" val="tx"/>
+                      <ahyp:hlinkClr xmlns:ahyp="http://schemas.microsoft.com/office/drawing/2018/hyperlinkcolor" xmlns="" val="tx"/>
                     </a:ext>
                   </a:extLst>
                 </a:hlinkClick>
@@ -17173,7 +17207,7 @@
                 <a:hlinkClick r:id="rId4">
                   <a:extLst>
                     <a:ext uri="{A12FA001-AC4F-418D-AE19-62706E023703}">
-                      <ahyp:hlinkClr xmlns:ahyp="http://schemas.microsoft.com/office/drawing/2018/hyperlinkcolor" val="tx"/>
+                      <ahyp:hlinkClr xmlns:ahyp="http://schemas.microsoft.com/office/drawing/2018/hyperlinkcolor" xmlns="" val="tx"/>
                     </a:ext>
                   </a:extLst>
                 </a:hlinkClick>
@@ -17818,6 +17852,15 @@
               </a:rPr>
               <a:t>Laboratory and Case Study</a:t>
             </a:r>
+            <a:r>
+              <a:rPr lang="en-US" sz="3200" dirty="0">
+                <a:effectLst/>
+                <a:latin typeface="Calibri" panose="020F0502020204030204" pitchFamily="34" charset="0"/>
+                <a:ea typeface="Calibri" panose="020F0502020204030204" pitchFamily="34" charset="0"/>
+                <a:cs typeface="Times New Roman" panose="02020603050405020304" pitchFamily="18" charset="0"/>
+              </a:rPr>
+              <a:t/>
+            </a:r>
             <a:br>
               <a:rPr lang="en-US" sz="3200" dirty="0">
                 <a:effectLst/>
@@ -18131,6 +18174,15 @@
                 <a:cs typeface="Times New Roman" panose="02020603050405020304" pitchFamily="18" charset="0"/>
               </a:rPr>
               <a:t>Reference Books</a:t>
+            </a:r>
+            <a:r>
+              <a:rPr lang="en-US" sz="1800" dirty="0">
+                <a:effectLst/>
+                <a:latin typeface="Calibri" panose="020F0502020204030204" pitchFamily="34" charset="0"/>
+                <a:ea typeface="Calibri" panose="020F0502020204030204" pitchFamily="34" charset="0"/>
+                <a:cs typeface="Times New Roman" panose="02020603050405020304" pitchFamily="18" charset="0"/>
+              </a:rPr>
+              <a:t/>
             </a:r>
             <a:br>
               <a:rPr lang="en-US" sz="1800" dirty="0">

</xml_diff>